<commit_message>
updated S4 and people
</commit_message>
<xml_diff>
--- a/assets/logos.pptx
+++ b/assets/logos.pptx
@@ -105,6 +105,11 @@
       </a:defRPr>
     </a:lvl9pPr>
   </p:defaultTextStyle>
+  <p:extLst>
+    <p:ext uri="{EFAFB233-063F-42B5-8137-9DF3F51BA10A}">
+      <p15:sldGuideLst xmlns:p15="http://schemas.microsoft.com/office/powerpoint/2012/main"/>
+    </p:ext>
+  </p:extLst>
 </p:presentation>
 </file>
 
@@ -255,7 +260,7 @@
           <a:p>
             <a:fld id="{6A6DF50A-5C5E-9D4C-875D-F25B75E243E6}" type="datetimeFigureOut">
               <a:rPr lang="en-US" smtClean="0"/>
-              <a:t>12/9/19</a:t>
+              <a:t>12/11/19</a:t>
             </a:fld>
             <a:endParaRPr lang="en-US" dirty="0"/>
           </a:p>
@@ -453,7 +458,7 @@
           <a:p>
             <a:fld id="{6A6DF50A-5C5E-9D4C-875D-F25B75E243E6}" type="datetimeFigureOut">
               <a:rPr lang="en-US" smtClean="0"/>
-              <a:t>12/9/19</a:t>
+              <a:t>12/11/19</a:t>
             </a:fld>
             <a:endParaRPr lang="en-US" dirty="0"/>
           </a:p>
@@ -661,7 +666,7 @@
           <a:p>
             <a:fld id="{6A6DF50A-5C5E-9D4C-875D-F25B75E243E6}" type="datetimeFigureOut">
               <a:rPr lang="en-US" smtClean="0"/>
-              <a:t>12/9/19</a:t>
+              <a:t>12/11/19</a:t>
             </a:fld>
             <a:endParaRPr lang="en-US" dirty="0"/>
           </a:p>
@@ -859,7 +864,7 @@
           <a:p>
             <a:fld id="{6A6DF50A-5C5E-9D4C-875D-F25B75E243E6}" type="datetimeFigureOut">
               <a:rPr lang="en-US" smtClean="0"/>
-              <a:t>12/9/19</a:t>
+              <a:t>12/11/19</a:t>
             </a:fld>
             <a:endParaRPr lang="en-US" dirty="0"/>
           </a:p>
@@ -1134,7 +1139,7 @@
           <a:p>
             <a:fld id="{6A6DF50A-5C5E-9D4C-875D-F25B75E243E6}" type="datetimeFigureOut">
               <a:rPr lang="en-US" smtClean="0"/>
-              <a:t>12/9/19</a:t>
+              <a:t>12/11/19</a:t>
             </a:fld>
             <a:endParaRPr lang="en-US" dirty="0"/>
           </a:p>
@@ -1399,7 +1404,7 @@
           <a:p>
             <a:fld id="{6A6DF50A-5C5E-9D4C-875D-F25B75E243E6}" type="datetimeFigureOut">
               <a:rPr lang="en-US" smtClean="0"/>
-              <a:t>12/9/19</a:t>
+              <a:t>12/11/19</a:t>
             </a:fld>
             <a:endParaRPr lang="en-US" dirty="0"/>
           </a:p>
@@ -1811,7 +1816,7 @@
           <a:p>
             <a:fld id="{6A6DF50A-5C5E-9D4C-875D-F25B75E243E6}" type="datetimeFigureOut">
               <a:rPr lang="en-US" smtClean="0"/>
-              <a:t>12/9/19</a:t>
+              <a:t>12/11/19</a:t>
             </a:fld>
             <a:endParaRPr lang="en-US" dirty="0"/>
           </a:p>
@@ -1952,7 +1957,7 @@
           <a:p>
             <a:fld id="{6A6DF50A-5C5E-9D4C-875D-F25B75E243E6}" type="datetimeFigureOut">
               <a:rPr lang="en-US" smtClean="0"/>
-              <a:t>12/9/19</a:t>
+              <a:t>12/11/19</a:t>
             </a:fld>
             <a:endParaRPr lang="en-US" dirty="0"/>
           </a:p>
@@ -2065,7 +2070,7 @@
           <a:p>
             <a:fld id="{6A6DF50A-5C5E-9D4C-875D-F25B75E243E6}" type="datetimeFigureOut">
               <a:rPr lang="en-US" smtClean="0"/>
-              <a:t>12/9/19</a:t>
+              <a:t>12/11/19</a:t>
             </a:fld>
             <a:endParaRPr lang="en-US" dirty="0"/>
           </a:p>
@@ -2376,7 +2381,7 @@
           <a:p>
             <a:fld id="{6A6DF50A-5C5E-9D4C-875D-F25B75E243E6}" type="datetimeFigureOut">
               <a:rPr lang="en-US" smtClean="0"/>
-              <a:t>12/9/19</a:t>
+              <a:t>12/11/19</a:t>
             </a:fld>
             <a:endParaRPr lang="en-US" dirty="0"/>
           </a:p>
@@ -2664,7 +2669,7 @@
           <a:p>
             <a:fld id="{6A6DF50A-5C5E-9D4C-875D-F25B75E243E6}" type="datetimeFigureOut">
               <a:rPr lang="en-US" smtClean="0"/>
-              <a:t>12/9/19</a:t>
+              <a:t>12/11/19</a:t>
             </a:fld>
             <a:endParaRPr lang="en-US" dirty="0"/>
           </a:p>
@@ -2905,7 +2910,7 @@
           <a:p>
             <a:fld id="{6A6DF50A-5C5E-9D4C-875D-F25B75E243E6}" type="datetimeFigureOut">
               <a:rPr lang="en-US" smtClean="0"/>
-              <a:t>12/9/19</a:t>
+              <a:t>12/11/19</a:t>
             </a:fld>
             <a:endParaRPr lang="en-US" dirty="0"/>
           </a:p>
@@ -3336,7 +3341,7 @@
         </p:nvSpPr>
         <p:spPr>
           <a:xfrm>
-            <a:off x="3238004" y="2708991"/>
+            <a:off x="5374812" y="3459761"/>
             <a:ext cx="3791423" cy="615553"/>
           </a:xfrm>
           <a:prstGeom prst="rect">
@@ -3416,7 +3421,7 @@
         </p:nvSpPr>
         <p:spPr>
           <a:xfrm>
-            <a:off x="2634117" y="2724380"/>
+            <a:off x="4770925" y="3475150"/>
             <a:ext cx="543739" cy="584775"/>
           </a:xfrm>
           <a:prstGeom prst="rect">
@@ -3509,7 +3514,7 @@
         </p:nvSpPr>
         <p:spPr>
           <a:xfrm>
-            <a:off x="3238004" y="2708991"/>
+            <a:off x="5240058" y="4335661"/>
             <a:ext cx="3791423" cy="615553"/>
           </a:xfrm>
           <a:prstGeom prst="rect">
@@ -3589,7 +3594,7 @@
         </p:nvSpPr>
         <p:spPr>
           <a:xfrm>
-            <a:off x="2634117" y="2724380"/>
+            <a:off x="4636171" y="4351050"/>
             <a:ext cx="543739" cy="584775"/>
           </a:xfrm>
           <a:prstGeom prst="rect">
@@ -3659,7 +3664,7 @@
         </p:blipFill>
         <p:spPr>
           <a:xfrm>
-            <a:off x="2634117" y="185723"/>
+            <a:off x="4636171" y="1812393"/>
             <a:ext cx="4259926" cy="2336096"/>
           </a:xfrm>
           <a:prstGeom prst="rect">
@@ -3681,7 +3686,7 @@
         </p:nvSpPr>
         <p:spPr>
           <a:xfrm>
-            <a:off x="2512194" y="0"/>
+            <a:off x="4514248" y="1626670"/>
             <a:ext cx="4517233" cy="3455469"/>
           </a:xfrm>
           <a:prstGeom prst="rect">

</xml_diff>